<commit_message>
Updated multi-threading presentation and samples
</commit_message>
<xml_diff>
--- a/Presentation/lesson-08-multithreading.pptx
+++ b/Presentation/lesson-08-multithreading.pptx
@@ -217,7 +217,7 @@
           <a:p>
             <a:fld id="{B24A7054-7FFB-49F4-A126-5DF6E687FF53}" type="datetimeFigureOut">
               <a:rPr lang="ru-RU" smtClean="0"/>
-              <a:t>27.03.2013</a:t>
+              <a:t>13.04.2013</a:t>
             </a:fld>
             <a:endParaRPr lang="ru-RU"/>
           </a:p>
@@ -1499,7 +1499,7 @@
           <a:p>
             <a:fld id="{8E6E6A2A-E9D3-4A0D-B04A-ABDD367A1E08}" type="datetimeFigureOut">
               <a:rPr lang="ru-RU" smtClean="0"/>
-              <a:t>27.03.2013</a:t>
+              <a:t>13.04.2013</a:t>
             </a:fld>
             <a:endParaRPr lang="ru-RU"/>
           </a:p>
@@ -2944,7 +2944,7 @@
           <a:p>
             <a:fld id="{AC3D3127-B7C4-45E3-9797-C527EC9FDD78}" type="datetimeFigureOut">
               <a:rPr lang="ru-RU" smtClean="0"/>
-              <a:t>27.03.2013</a:t>
+              <a:t>13.04.2013</a:t>
             </a:fld>
             <a:endParaRPr lang="ru-RU"/>
           </a:p>
@@ -14091,7 +14091,23 @@
           <a:p>
             <a:r>
               <a:rPr lang="ru-RU" sz="2400" dirty="0" smtClean="0"/>
-              <a:t>Набор классов предназначенных для облегчения многопоточной программирования. Представлена в </a:t>
+              <a:t>Набор классов предназначенных для облегчения </a:t>
+            </a:r>
+            <a:r>
+              <a:rPr lang="ru-RU" sz="2400" dirty="0" smtClean="0"/>
+              <a:t>многопоточного </a:t>
+            </a:r>
+            <a:r>
+              <a:rPr lang="ru-RU" sz="2400" dirty="0" smtClean="0"/>
+              <a:t>программирования. </a:t>
+            </a:r>
+            <a:r>
+              <a:rPr lang="ru-RU" sz="2400" dirty="0" smtClean="0"/>
+              <a:t>Представлены </a:t>
+            </a:r>
+            <a:r>
+              <a:rPr lang="ru-RU" sz="2400" dirty="0" smtClean="0"/>
+              <a:t>в </a:t>
             </a:r>
             <a:r>
               <a:rPr lang="en-US" sz="2400" dirty="0" smtClean="0"/>
@@ -14449,7 +14465,11 @@
               <a:buChar char="•"/>
             </a:pPr>
             <a:r>
-              <a:rPr lang="en-US" sz="2400" dirty="0"/>
+              <a:rPr lang="en-US" sz="2400" dirty="0">
+                <a:solidFill>
+                  <a:srgbClr val="FFFF00"/>
+                </a:solidFill>
+              </a:rPr>
               <a:t>COM (Component Object Model)</a:t>
             </a:r>
           </a:p>

</xml_diff>

<commit_message>
Updated thread demo and presentation
</commit_message>
<xml_diff>
--- a/Presentation/lesson-08-multithreading.pptx
+++ b/Presentation/lesson-08-multithreading.pptx
@@ -6,7 +6,7 @@
     <p:sldMasterId id="2147483663" r:id="rId2"/>
   </p:sldMasterIdLst>
   <p:notesMasterIdLst>
-    <p:notesMasterId r:id="rId41"/>
+    <p:notesMasterId r:id="rId42"/>
   </p:notesMasterIdLst>
   <p:sldIdLst>
     <p:sldId id="256" r:id="rId3"/>
@@ -29,24 +29,25 @@
     <p:sldId id="287" r:id="rId20"/>
     <p:sldId id="289" r:id="rId21"/>
     <p:sldId id="290" r:id="rId22"/>
-    <p:sldId id="267" r:id="rId23"/>
-    <p:sldId id="268" r:id="rId24"/>
-    <p:sldId id="269" r:id="rId25"/>
-    <p:sldId id="270" r:id="rId26"/>
-    <p:sldId id="271" r:id="rId27"/>
-    <p:sldId id="272" r:id="rId28"/>
-    <p:sldId id="285" r:id="rId29"/>
-    <p:sldId id="288" r:id="rId30"/>
-    <p:sldId id="278" r:id="rId31"/>
-    <p:sldId id="273" r:id="rId32"/>
-    <p:sldId id="274" r:id="rId33"/>
-    <p:sldId id="275" r:id="rId34"/>
-    <p:sldId id="277" r:id="rId35"/>
-    <p:sldId id="282" r:id="rId36"/>
-    <p:sldId id="279" r:id="rId37"/>
-    <p:sldId id="280" r:id="rId38"/>
-    <p:sldId id="276" r:id="rId39"/>
-    <p:sldId id="291" r:id="rId40"/>
+    <p:sldId id="296" r:id="rId23"/>
+    <p:sldId id="267" r:id="rId24"/>
+    <p:sldId id="268" r:id="rId25"/>
+    <p:sldId id="269" r:id="rId26"/>
+    <p:sldId id="270" r:id="rId27"/>
+    <p:sldId id="271" r:id="rId28"/>
+    <p:sldId id="272" r:id="rId29"/>
+    <p:sldId id="285" r:id="rId30"/>
+    <p:sldId id="288" r:id="rId31"/>
+    <p:sldId id="278" r:id="rId32"/>
+    <p:sldId id="273" r:id="rId33"/>
+    <p:sldId id="274" r:id="rId34"/>
+    <p:sldId id="275" r:id="rId35"/>
+    <p:sldId id="277" r:id="rId36"/>
+    <p:sldId id="282" r:id="rId37"/>
+    <p:sldId id="279" r:id="rId38"/>
+    <p:sldId id="280" r:id="rId39"/>
+    <p:sldId id="276" r:id="rId40"/>
+    <p:sldId id="291" r:id="rId41"/>
   </p:sldIdLst>
   <p:sldSz cx="9144000" cy="6858000" type="screen4x3"/>
   <p:notesSz cx="6858000" cy="9144000"/>
@@ -230,7 +231,7 @@
           <a:p>
             <a:fld id="{B24A7054-7FFB-49F4-A126-5DF6E687FF53}" type="datetimeFigureOut">
               <a:rPr lang="ru-RU" smtClean="0"/>
-              <a:t>18.11.2013</a:t>
+              <a:t>20.11.2013</a:t>
             </a:fld>
             <a:endParaRPr lang="ru-RU"/>
           </a:p>
@@ -1512,7 +1513,7 @@
           <a:p>
             <a:fld id="{8E6E6A2A-E9D3-4A0D-B04A-ABDD367A1E08}" type="datetimeFigureOut">
               <a:rPr lang="ru-RU" smtClean="0"/>
-              <a:t>18.11.2013</a:t>
+              <a:t>20.11.2013</a:t>
             </a:fld>
             <a:endParaRPr lang="ru-RU"/>
           </a:p>
@@ -1761,7 +1762,7 @@
                 </a:solidFill>
               </a:rPr>
               <a:pPr/>
-              <a:t>11/18/2013</a:t>
+              <a:t>11/20/2013</a:t>
             </a:fld>
             <a:endParaRPr lang="en-US">
               <a:solidFill>
@@ -1963,7 +1964,7 @@
                 </a:solidFill>
               </a:rPr>
               <a:pPr/>
-              <a:t>11/18/2013</a:t>
+              <a:t>11/20/2013</a:t>
             </a:fld>
             <a:endParaRPr lang="en-US">
               <a:solidFill>
@@ -2241,7 +2242,7 @@
                 </a:solidFill>
               </a:rPr>
               <a:pPr/>
-              <a:t>11/18/2013</a:t>
+              <a:t>11/20/2013</a:t>
             </a:fld>
             <a:endParaRPr lang="en-US">
               <a:solidFill>
@@ -2561,7 +2562,7 @@
                 </a:solidFill>
               </a:rPr>
               <a:pPr/>
-              <a:t>11/18/2013</a:t>
+              <a:t>11/20/2013</a:t>
             </a:fld>
             <a:endParaRPr lang="en-US">
               <a:solidFill>
@@ -3015,7 +3016,7 @@
                 </a:solidFill>
               </a:rPr>
               <a:pPr/>
-              <a:t>11/18/2013</a:t>
+              <a:t>11/20/2013</a:t>
             </a:fld>
             <a:endParaRPr lang="en-US">
               <a:solidFill>
@@ -3374,7 +3375,7 @@
                 </a:solidFill>
               </a:rPr>
               <a:pPr/>
-              <a:t>11/18/2013</a:t>
+              <a:t>11/20/2013</a:t>
             </a:fld>
             <a:endParaRPr lang="en-US">
               <a:solidFill>
@@ -3501,7 +3502,7 @@
                 </a:solidFill>
               </a:rPr>
               <a:pPr/>
-              <a:t>11/18/2013</a:t>
+              <a:t>11/20/2013</a:t>
             </a:fld>
             <a:endParaRPr lang="en-US">
               <a:solidFill>
@@ -3810,7 +3811,7 @@
                 </a:solidFill>
               </a:rPr>
               <a:pPr/>
-              <a:t>11/18/2013</a:t>
+              <a:t>11/20/2013</a:t>
             </a:fld>
             <a:endParaRPr lang="en-US">
               <a:solidFill>
@@ -4095,7 +4096,7 @@
                 </a:solidFill>
               </a:rPr>
               <a:pPr/>
-              <a:t>11/18/2013</a:t>
+              <a:t>11/20/2013</a:t>
             </a:fld>
             <a:endParaRPr lang="en-US">
               <a:solidFill>
@@ -4297,7 +4298,7 @@
                 </a:solidFill>
               </a:rPr>
               <a:pPr/>
-              <a:t>11/18/2013</a:t>
+              <a:t>11/20/2013</a:t>
             </a:fld>
             <a:endParaRPr lang="en-US">
               <a:solidFill>
@@ -4509,7 +4510,7 @@
                 </a:solidFill>
               </a:rPr>
               <a:pPr/>
-              <a:t>11/18/2013</a:t>
+              <a:t>11/20/2013</a:t>
             </a:fld>
             <a:endParaRPr lang="en-US">
               <a:solidFill>
@@ -5770,7 +5771,7 @@
           <a:p>
             <a:fld id="{AC3D3127-B7C4-45E3-9797-C527EC9FDD78}" type="datetimeFigureOut">
               <a:rPr lang="ru-RU" smtClean="0"/>
-              <a:t>18.11.2013</a:t>
+              <a:t>20.11.2013</a:t>
             </a:fld>
             <a:endParaRPr lang="ru-RU"/>
           </a:p>
@@ -6297,7 +6298,7 @@
                 </a:solidFill>
               </a:rPr>
               <a:pPr/>
-              <a:t>11/18/2013</a:t>
+              <a:t>11/20/2013</a:t>
             </a:fld>
             <a:endParaRPr lang="en-US">
               <a:solidFill>
@@ -12272,11 +12273,7 @@
             </a:r>
             <a:r>
               <a:rPr lang="ru-RU" sz="2000" smtClean="0"/>
-              <a:t>стек </a:t>
-            </a:r>
-            <a:r>
-              <a:rPr lang="ru-RU" sz="2000" smtClean="0"/>
-              <a:t>вызово</a:t>
+              <a:t>стек вызово</a:t>
             </a:r>
             <a:r>
               <a:rPr lang="ru-RU" sz="2000"/>
@@ -14238,6 +14235,150 @@
       </p:grpSpPr>
       <p:sp>
         <p:nvSpPr>
+          <p:cNvPr id="2" name="Title 1"/>
+          <p:cNvSpPr>
+            <a:spLocks noGrp="1"/>
+          </p:cNvSpPr>
+          <p:nvPr>
+            <p:ph type="title"/>
+          </p:nvPr>
+        </p:nvSpPr>
+        <p:spPr/>
+        <p:txBody>
+          <a:bodyPr>
+            <a:normAutofit fontScale="90000"/>
+          </a:bodyPr>
+          <a:lstStyle/>
+          <a:p>
+            <a:r>
+              <a:rPr lang="ru-RU" dirty="0" smtClean="0"/>
+              <a:t>Многопоточность и </a:t>
+            </a:r>
+            <a:r>
+              <a:rPr lang="en-US" dirty="0" smtClean="0"/>
+              <a:t>GUI </a:t>
+            </a:r>
+            <a:r>
+              <a:rPr lang="ru-RU" dirty="0" smtClean="0"/>
+              <a:t>приложения</a:t>
+            </a:r>
+            <a:endParaRPr lang="en-US" dirty="0"/>
+          </a:p>
+        </p:txBody>
+      </p:sp>
+      <p:sp>
+        <p:nvSpPr>
+          <p:cNvPr id="3" name="Content Placeholder 2"/>
+          <p:cNvSpPr>
+            <a:spLocks noGrp="1"/>
+          </p:cNvSpPr>
+          <p:nvPr>
+            <p:ph idx="1"/>
+          </p:nvPr>
+        </p:nvSpPr>
+        <p:spPr/>
+        <p:txBody>
+          <a:bodyPr/>
+          <a:lstStyle/>
+          <a:p>
+            <a:r>
+              <a:rPr lang="ru-RU" dirty="0" smtClean="0"/>
+              <a:t>Отдельный поток</a:t>
+            </a:r>
+            <a:endParaRPr lang="en-US" dirty="0" smtClean="0"/>
+          </a:p>
+          <a:p>
+            <a:r>
+              <a:rPr lang="en-US" dirty="0" err="1" smtClean="0"/>
+              <a:t>Control.Invoke</a:t>
+            </a:r>
+            <a:r>
+              <a:rPr lang="en-US" dirty="0" smtClean="0"/>
+              <a:t>(delegate)</a:t>
+            </a:r>
+            <a:endParaRPr lang="ru-RU" dirty="0" smtClean="0"/>
+          </a:p>
+          <a:p>
+            <a:r>
+              <a:rPr lang="en-US" dirty="0" err="1" smtClean="0"/>
+              <a:t>BackgroundWorker</a:t>
+            </a:r>
+            <a:endParaRPr lang="en-US" dirty="0" smtClean="0"/>
+          </a:p>
+          <a:p>
+            <a:r>
+              <a:rPr lang="en-US" dirty="0" smtClean="0"/>
+              <a:t>Event-based </a:t>
+            </a:r>
+            <a:r>
+              <a:rPr lang="en-US" dirty="0"/>
+              <a:t>Asynchronous </a:t>
+            </a:r>
+            <a:r>
+              <a:rPr lang="en-US" dirty="0" smtClean="0"/>
+              <a:t>Pattern</a:t>
+            </a:r>
+          </a:p>
+          <a:p>
+            <a:pPr lvl="1"/>
+            <a:r>
+              <a:rPr lang="en-US" dirty="0">
+                <a:hlinkClick r:id="rId2"/>
+              </a:rPr>
+              <a:t>http://</a:t>
+            </a:r>
+            <a:r>
+              <a:rPr lang="en-US" dirty="0" smtClean="0">
+                <a:hlinkClick r:id="rId2"/>
+              </a:rPr>
+              <a:t>msdn.microsoft.com/en-us/library/ms228969%28v=vs.110%29.aspx</a:t>
+            </a:r>
+            <a:endParaRPr lang="en-US" dirty="0" smtClean="0"/>
+          </a:p>
+          <a:p>
+            <a:r>
+              <a:rPr lang="en-US" dirty="0" err="1" smtClean="0"/>
+              <a:t>SynchronizationContext</a:t>
+            </a:r>
+            <a:endParaRPr lang="en-US" dirty="0" smtClean="0"/>
+          </a:p>
+          <a:p>
+            <a:endParaRPr lang="en-US" dirty="0"/>
+          </a:p>
+        </p:txBody>
+      </p:sp>
+    </p:spTree>
+    <p:extLst>
+      <p:ext uri="{BB962C8B-B14F-4D97-AF65-F5344CB8AC3E}">
+        <p14:creationId xmlns:p14="http://schemas.microsoft.com/office/powerpoint/2010/main" val="3555303545"/>
+      </p:ext>
+    </p:extLst>
+  </p:cSld>
+  <p:clrMapOvr>
+    <a:masterClrMapping/>
+  </p:clrMapOvr>
+</p:sld>
+</file>
+
+<file path=ppt/slides/slide22.xml><?xml version="1.0" encoding="utf-8"?>
+<p:sld xmlns:a="http://schemas.openxmlformats.org/drawingml/2006/main" xmlns:r="http://schemas.openxmlformats.org/officeDocument/2006/relationships" xmlns:p="http://schemas.openxmlformats.org/presentationml/2006/main">
+  <p:cSld>
+    <p:spTree>
+      <p:nvGrpSpPr>
+        <p:cNvPr id="1" name=""/>
+        <p:cNvGrpSpPr/>
+        <p:nvPr/>
+      </p:nvGrpSpPr>
+      <p:grpSpPr>
+        <a:xfrm>
+          <a:off x="0" y="0"/>
+          <a:ext cx="0" cy="0"/>
+          <a:chOff x="0" y="0"/>
+          <a:chExt cx="0" cy="0"/>
+        </a:xfrm>
+      </p:grpSpPr>
+      <p:sp>
+        <p:nvSpPr>
           <p:cNvPr id="8194" name="Rectangle 3"/>
           <p:cNvSpPr>
             <a:spLocks noChangeArrowheads="1"/>
@@ -15093,7 +15234,7 @@
 </p:sld>
 </file>
 
-<file path=ppt/slides/slide22.xml><?xml version="1.0" encoding="utf-8"?>
+<file path=ppt/slides/slide23.xml><?xml version="1.0" encoding="utf-8"?>
 <p:sld xmlns:a="http://schemas.openxmlformats.org/drawingml/2006/main" xmlns:r="http://schemas.openxmlformats.org/officeDocument/2006/relationships" xmlns:p="http://schemas.openxmlformats.org/presentationml/2006/main">
   <p:cSld>
     <p:spTree>
@@ -16134,7 +16275,7 @@
 </p:sld>
 </file>
 
-<file path=ppt/slides/slide23.xml><?xml version="1.0" encoding="utf-8"?>
+<file path=ppt/slides/slide24.xml><?xml version="1.0" encoding="utf-8"?>
 <p:sld xmlns:a="http://schemas.openxmlformats.org/drawingml/2006/main" xmlns:r="http://schemas.openxmlformats.org/officeDocument/2006/relationships" xmlns:p="http://schemas.openxmlformats.org/presentationml/2006/main">
   <p:cSld>
     <p:spTree>
@@ -17156,7 +17297,7 @@
 </p:sld>
 </file>
 
-<file path=ppt/slides/slide24.xml><?xml version="1.0" encoding="utf-8"?>
+<file path=ppt/slides/slide25.xml><?xml version="1.0" encoding="utf-8"?>
 <p:sld xmlns:a="http://schemas.openxmlformats.org/drawingml/2006/main" xmlns:r="http://schemas.openxmlformats.org/officeDocument/2006/relationships" xmlns:p="http://schemas.openxmlformats.org/presentationml/2006/main">
   <p:cSld>
     <p:spTree>
@@ -17559,7 +17700,7 @@
 </p:sld>
 </file>
 
-<file path=ppt/slides/slide25.xml><?xml version="1.0" encoding="utf-8"?>
+<file path=ppt/slides/slide26.xml><?xml version="1.0" encoding="utf-8"?>
 <p:sld xmlns:a="http://schemas.openxmlformats.org/drawingml/2006/main" xmlns:r="http://schemas.openxmlformats.org/officeDocument/2006/relationships" xmlns:p="http://schemas.openxmlformats.org/presentationml/2006/main">
   <p:cSld>
     <p:spTree>
@@ -18615,7 +18756,7 @@
 </p:sld>
 </file>
 
-<file path=ppt/slides/slide26.xml><?xml version="1.0" encoding="utf-8"?>
+<file path=ppt/slides/slide27.xml><?xml version="1.0" encoding="utf-8"?>
 <p:sld xmlns:a="http://schemas.openxmlformats.org/drawingml/2006/main" xmlns:r="http://schemas.openxmlformats.org/officeDocument/2006/relationships" xmlns:p="http://schemas.openxmlformats.org/presentationml/2006/main">
   <p:cSld>
     <p:spTree>
@@ -19427,116 +19568,6 @@
     <p:extLst>
       <p:ext uri="{BB962C8B-B14F-4D97-AF65-F5344CB8AC3E}">
         <p14:creationId xmlns:p14="http://schemas.microsoft.com/office/powerpoint/2010/main" val="2851491993"/>
-      </p:ext>
-    </p:extLst>
-  </p:cSld>
-  <p:clrMapOvr>
-    <a:masterClrMapping/>
-  </p:clrMapOvr>
-  <p:timing>
-    <p:tnLst>
-      <p:par>
-        <p:cTn id="1" dur="indefinite" restart="never" nodeType="tmRoot"/>
-      </p:par>
-    </p:tnLst>
-  </p:timing>
-</p:sld>
-</file>
-
-<file path=ppt/slides/slide27.xml><?xml version="1.0" encoding="utf-8"?>
-<p:sld xmlns:a="http://schemas.openxmlformats.org/drawingml/2006/main" xmlns:r="http://schemas.openxmlformats.org/officeDocument/2006/relationships" xmlns:p="http://schemas.openxmlformats.org/presentationml/2006/main">
-  <p:cSld>
-    <p:spTree>
-      <p:nvGrpSpPr>
-        <p:cNvPr id="1" name=""/>
-        <p:cNvGrpSpPr/>
-        <p:nvPr/>
-      </p:nvGrpSpPr>
-      <p:grpSpPr>
-        <a:xfrm>
-          <a:off x="0" y="0"/>
-          <a:ext cx="0" cy="0"/>
-          <a:chOff x="0" y="0"/>
-          <a:chExt cx="0" cy="0"/>
-        </a:xfrm>
-      </p:grpSpPr>
-      <p:sp>
-        <p:nvSpPr>
-          <p:cNvPr id="2" name="Title 1"/>
-          <p:cNvSpPr>
-            <a:spLocks noGrp="1"/>
-          </p:cNvSpPr>
-          <p:nvPr>
-            <p:ph type="title"/>
-          </p:nvPr>
-        </p:nvSpPr>
-        <p:spPr/>
-        <p:txBody>
-          <a:bodyPr>
-            <a:normAutofit/>
-          </a:bodyPr>
-          <a:lstStyle/>
-          <a:p>
-            <a:r>
-              <a:rPr lang="ru-RU" dirty="0" smtClean="0"/>
-              <a:t>Анти-паттерны для </a:t>
-            </a:r>
-            <a:r>
-              <a:rPr lang="en-US" dirty="0" smtClean="0"/>
-              <a:t>lock</a:t>
-            </a:r>
-            <a:endParaRPr lang="en-US" dirty="0"/>
-          </a:p>
-        </p:txBody>
-      </p:sp>
-      <p:sp>
-        <p:nvSpPr>
-          <p:cNvPr id="3" name="Content Placeholder 2"/>
-          <p:cNvSpPr>
-            <a:spLocks noGrp="1"/>
-          </p:cNvSpPr>
-          <p:nvPr>
-            <p:ph idx="1"/>
-          </p:nvPr>
-        </p:nvSpPr>
-        <p:spPr/>
-        <p:txBody>
-          <a:bodyPr>
-            <a:normAutofit/>
-          </a:bodyPr>
-          <a:lstStyle/>
-          <a:p>
-            <a:r>
-              <a:rPr lang="ru-RU" dirty="0" smtClean="0"/>
-              <a:t>Не используйте </a:t>
-            </a:r>
-            <a:r>
-              <a:rPr lang="en-US" dirty="0" smtClean="0"/>
-              <a:t>lock(this) </a:t>
-            </a:r>
-            <a:r>
-              <a:rPr lang="ru-RU" dirty="0" smtClean="0"/>
-              <a:t>или </a:t>
-            </a:r>
-            <a:r>
-              <a:rPr lang="en-US" dirty="0"/>
-              <a:t>lock(System. Type</a:t>
-            </a:r>
-            <a:r>
-              <a:rPr lang="en-US" dirty="0" smtClean="0"/>
-              <a:t>) </a:t>
-            </a:r>
-            <a:r>
-              <a:rPr lang="ru-RU" dirty="0" smtClean="0"/>
-              <a:t>т.к. внешний код имеет доступ к этим значениям, может ими воспользоваться для блокировки и что, в итоге, может привести к взаимоблокировке.</a:t>
-            </a:r>
-          </a:p>
-        </p:txBody>
-      </p:sp>
-    </p:spTree>
-    <p:extLst>
-      <p:ext uri="{BB962C8B-B14F-4D97-AF65-F5344CB8AC3E}">
-        <p14:creationId xmlns:p14="http://schemas.microsoft.com/office/powerpoint/2010/main" val="1963057545"/>
       </p:ext>
     </p:extLst>
   </p:cSld>
@@ -19583,6 +19614,116 @@
         <p:spPr/>
         <p:txBody>
           <a:bodyPr>
+            <a:normAutofit/>
+          </a:bodyPr>
+          <a:lstStyle/>
+          <a:p>
+            <a:r>
+              <a:rPr lang="ru-RU" dirty="0" smtClean="0"/>
+              <a:t>Анти-паттерны для </a:t>
+            </a:r>
+            <a:r>
+              <a:rPr lang="en-US" dirty="0" smtClean="0"/>
+              <a:t>lock</a:t>
+            </a:r>
+            <a:endParaRPr lang="en-US" dirty="0"/>
+          </a:p>
+        </p:txBody>
+      </p:sp>
+      <p:sp>
+        <p:nvSpPr>
+          <p:cNvPr id="3" name="Content Placeholder 2"/>
+          <p:cNvSpPr>
+            <a:spLocks noGrp="1"/>
+          </p:cNvSpPr>
+          <p:nvPr>
+            <p:ph idx="1"/>
+          </p:nvPr>
+        </p:nvSpPr>
+        <p:spPr/>
+        <p:txBody>
+          <a:bodyPr>
+            <a:normAutofit/>
+          </a:bodyPr>
+          <a:lstStyle/>
+          <a:p>
+            <a:r>
+              <a:rPr lang="ru-RU" dirty="0" smtClean="0"/>
+              <a:t>Не используйте </a:t>
+            </a:r>
+            <a:r>
+              <a:rPr lang="en-US" dirty="0" smtClean="0"/>
+              <a:t>lock(this) </a:t>
+            </a:r>
+            <a:r>
+              <a:rPr lang="ru-RU" dirty="0" smtClean="0"/>
+              <a:t>или </a:t>
+            </a:r>
+            <a:r>
+              <a:rPr lang="en-US" dirty="0"/>
+              <a:t>lock(System. Type</a:t>
+            </a:r>
+            <a:r>
+              <a:rPr lang="en-US" dirty="0" smtClean="0"/>
+              <a:t>) </a:t>
+            </a:r>
+            <a:r>
+              <a:rPr lang="ru-RU" dirty="0" smtClean="0"/>
+              <a:t>т.к. внешний код имеет доступ к этим значениям, может ими воспользоваться для блокировки и что, в итоге, может привести к взаимоблокировке.</a:t>
+            </a:r>
+          </a:p>
+        </p:txBody>
+      </p:sp>
+    </p:spTree>
+    <p:extLst>
+      <p:ext uri="{BB962C8B-B14F-4D97-AF65-F5344CB8AC3E}">
+        <p14:creationId xmlns:p14="http://schemas.microsoft.com/office/powerpoint/2010/main" val="1963057545"/>
+      </p:ext>
+    </p:extLst>
+  </p:cSld>
+  <p:clrMapOvr>
+    <a:masterClrMapping/>
+  </p:clrMapOvr>
+  <p:timing>
+    <p:tnLst>
+      <p:par>
+        <p:cTn id="1" dur="indefinite" restart="never" nodeType="tmRoot"/>
+      </p:par>
+    </p:tnLst>
+  </p:timing>
+</p:sld>
+</file>
+
+<file path=ppt/slides/slide29.xml><?xml version="1.0" encoding="utf-8"?>
+<p:sld xmlns:a="http://schemas.openxmlformats.org/drawingml/2006/main" xmlns:r="http://schemas.openxmlformats.org/officeDocument/2006/relationships" xmlns:p="http://schemas.openxmlformats.org/presentationml/2006/main">
+  <p:cSld>
+    <p:spTree>
+      <p:nvGrpSpPr>
+        <p:cNvPr id="1" name=""/>
+        <p:cNvGrpSpPr/>
+        <p:nvPr/>
+      </p:nvGrpSpPr>
+      <p:grpSpPr>
+        <a:xfrm>
+          <a:off x="0" y="0"/>
+          <a:ext cx="0" cy="0"/>
+          <a:chOff x="0" y="0"/>
+          <a:chExt cx="0" cy="0"/>
+        </a:xfrm>
+      </p:grpSpPr>
+      <p:sp>
+        <p:nvSpPr>
+          <p:cNvPr id="2" name="Title 1"/>
+          <p:cNvSpPr>
+            <a:spLocks noGrp="1"/>
+          </p:cNvSpPr>
+          <p:nvPr>
+            <p:ph type="title"/>
+          </p:nvPr>
+        </p:nvSpPr>
+        <p:spPr/>
+        <p:txBody>
+          <a:bodyPr>
             <a:normAutofit fontScale="90000"/>
           </a:bodyPr>
           <a:lstStyle/>
@@ -19709,7 +19850,185 @@
 </p:sld>
 </file>
 
-<file path=ppt/slides/slide29.xml><?xml version="1.0" encoding="utf-8"?>
+<file path=ppt/slides/slide3.xml><?xml version="1.0" encoding="utf-8"?>
+<p:sld xmlns:a="http://schemas.openxmlformats.org/drawingml/2006/main" xmlns:r="http://schemas.openxmlformats.org/officeDocument/2006/relationships" xmlns:p="http://schemas.openxmlformats.org/presentationml/2006/main">
+  <p:cSld>
+    <p:spTree>
+      <p:nvGrpSpPr>
+        <p:cNvPr id="1" name=""/>
+        <p:cNvGrpSpPr/>
+        <p:nvPr/>
+      </p:nvGrpSpPr>
+      <p:grpSpPr>
+        <a:xfrm>
+          <a:off x="0" y="0"/>
+          <a:ext cx="0" cy="0"/>
+          <a:chOff x="0" y="0"/>
+          <a:chExt cx="0" cy="0"/>
+        </a:xfrm>
+      </p:grpSpPr>
+      <p:sp>
+        <p:nvSpPr>
+          <p:cNvPr id="2" name="Title 1"/>
+          <p:cNvSpPr>
+            <a:spLocks noGrp="1"/>
+          </p:cNvSpPr>
+          <p:nvPr>
+            <p:ph type="title"/>
+          </p:nvPr>
+        </p:nvSpPr>
+        <p:spPr/>
+        <p:txBody>
+          <a:bodyPr/>
+          <a:lstStyle/>
+          <a:p>
+            <a:r>
+              <a:rPr lang="ru-RU" dirty="0">
+                <a:solidFill>
+                  <a:schemeClr val="bg1"/>
+                </a:solidFill>
+              </a:rPr>
+              <a:t>Материалы для обучения</a:t>
+            </a:r>
+            <a:endParaRPr lang="en-US" dirty="0">
+              <a:solidFill>
+                <a:schemeClr val="bg1"/>
+              </a:solidFill>
+            </a:endParaRPr>
+          </a:p>
+        </p:txBody>
+      </p:sp>
+      <p:sp>
+        <p:nvSpPr>
+          <p:cNvPr id="3" name="Content Placeholder 2"/>
+          <p:cNvSpPr>
+            <a:spLocks noGrp="1"/>
+          </p:cNvSpPr>
+          <p:nvPr>
+            <p:ph idx="1"/>
+          </p:nvPr>
+        </p:nvSpPr>
+        <p:spPr/>
+        <p:txBody>
+          <a:bodyPr/>
+          <a:lstStyle/>
+          <a:p>
+            <a:r>
+              <a:rPr lang="en-US" dirty="0">
+                <a:solidFill>
+                  <a:schemeClr val="bg1"/>
+                </a:solidFill>
+                <a:hlinkClick r:id="rId2"/>
+              </a:rPr>
+              <a:t>https://</a:t>
+            </a:r>
+            <a:r>
+              <a:rPr lang="en-US" dirty="0" smtClean="0">
+                <a:solidFill>
+                  <a:schemeClr val="bg1"/>
+                </a:solidFill>
+                <a:hlinkClick r:id="rId2"/>
+              </a:rPr>
+              <a:t>github.com/bazile/Training</a:t>
+            </a:r>
+            <a:r>
+              <a:rPr lang="en-US" dirty="0" smtClean="0">
+                <a:solidFill>
+                  <a:schemeClr val="bg1"/>
+                </a:solidFill>
+              </a:rPr>
+              <a:t/>
+            </a:r>
+            <a:br>
+              <a:rPr lang="en-US" dirty="0" smtClean="0">
+                <a:solidFill>
+                  <a:schemeClr val="bg1"/>
+                </a:solidFill>
+              </a:rPr>
+            </a:br>
+            <a:r>
+              <a:rPr lang="ru-RU" dirty="0" smtClean="0">
+                <a:solidFill>
+                  <a:schemeClr val="bg1"/>
+                </a:solidFill>
+              </a:rPr>
+              <a:t>Презентации и примеры кода используемые во время занятия</a:t>
+            </a:r>
+          </a:p>
+          <a:p>
+            <a:endParaRPr lang="ru-RU" dirty="0" smtClean="0">
+              <a:solidFill>
+                <a:schemeClr val="bg1"/>
+              </a:solidFill>
+            </a:endParaRPr>
+          </a:p>
+          <a:p>
+            <a:r>
+              <a:rPr lang="en-US" dirty="0">
+                <a:solidFill>
+                  <a:schemeClr val="bg1"/>
+                </a:solidFill>
+                <a:hlinkClick r:id="rId3"/>
+              </a:rPr>
+              <a:t>http://belhard.nullptr.ru</a:t>
+            </a:r>
+            <a:r>
+              <a:rPr lang="en-US" dirty="0" smtClean="0">
+                <a:solidFill>
+                  <a:schemeClr val="bg1"/>
+                </a:solidFill>
+                <a:hlinkClick r:id="rId3"/>
+              </a:rPr>
+              <a:t>/</a:t>
+            </a:r>
+            <a:r>
+              <a:rPr lang="ru-RU" dirty="0" smtClean="0">
+                <a:solidFill>
+                  <a:schemeClr val="bg1"/>
+                </a:solidFill>
+              </a:rPr>
+              <a:t/>
+            </a:r>
+            <a:br>
+              <a:rPr lang="ru-RU" dirty="0" smtClean="0">
+                <a:solidFill>
+                  <a:schemeClr val="bg1"/>
+                </a:solidFill>
+              </a:rPr>
+            </a:br>
+            <a:r>
+              <a:rPr lang="ru-RU" dirty="0" smtClean="0">
+                <a:solidFill>
+                  <a:schemeClr val="bg1"/>
+                </a:solidFill>
+              </a:rPr>
+              <a:t>Книги, примеры к ним и другие полезные файлы.</a:t>
+            </a:r>
+            <a:endParaRPr lang="ru-RU" dirty="0">
+              <a:solidFill>
+                <a:schemeClr val="bg1"/>
+              </a:solidFill>
+            </a:endParaRPr>
+          </a:p>
+          <a:p>
+            <a:endParaRPr lang="en-US" dirty="0"/>
+          </a:p>
+        </p:txBody>
+      </p:sp>
+    </p:spTree>
+    <p:extLst>
+      <p:ext uri="{BB962C8B-B14F-4D97-AF65-F5344CB8AC3E}">
+        <p14:creationId xmlns:p14="http://schemas.microsoft.com/office/powerpoint/2010/main" val="1546001890"/>
+      </p:ext>
+    </p:extLst>
+  </p:cSld>
+  <p:clrMapOvr>
+    <a:masterClrMapping/>
+  </p:clrMapOvr>
+</p:sld>
+</file>
+
+<file path=ppt/slides/slide30.xml><?xml version="1.0" encoding="utf-8"?>
 <p:sld xmlns:a="http://schemas.openxmlformats.org/drawingml/2006/main" xmlns:r="http://schemas.openxmlformats.org/officeDocument/2006/relationships" xmlns:p="http://schemas.openxmlformats.org/presentationml/2006/main">
   <p:cSld>
     <p:spTree>
@@ -20977,185 +21296,7 @@
 </p:sld>
 </file>
 
-<file path=ppt/slides/slide3.xml><?xml version="1.0" encoding="utf-8"?>
-<p:sld xmlns:a="http://schemas.openxmlformats.org/drawingml/2006/main" xmlns:r="http://schemas.openxmlformats.org/officeDocument/2006/relationships" xmlns:p="http://schemas.openxmlformats.org/presentationml/2006/main">
-  <p:cSld>
-    <p:spTree>
-      <p:nvGrpSpPr>
-        <p:cNvPr id="1" name=""/>
-        <p:cNvGrpSpPr/>
-        <p:nvPr/>
-      </p:nvGrpSpPr>
-      <p:grpSpPr>
-        <a:xfrm>
-          <a:off x="0" y="0"/>
-          <a:ext cx="0" cy="0"/>
-          <a:chOff x="0" y="0"/>
-          <a:chExt cx="0" cy="0"/>
-        </a:xfrm>
-      </p:grpSpPr>
-      <p:sp>
-        <p:nvSpPr>
-          <p:cNvPr id="2" name="Title 1"/>
-          <p:cNvSpPr>
-            <a:spLocks noGrp="1"/>
-          </p:cNvSpPr>
-          <p:nvPr>
-            <p:ph type="title"/>
-          </p:nvPr>
-        </p:nvSpPr>
-        <p:spPr/>
-        <p:txBody>
-          <a:bodyPr/>
-          <a:lstStyle/>
-          <a:p>
-            <a:r>
-              <a:rPr lang="ru-RU" dirty="0">
-                <a:solidFill>
-                  <a:schemeClr val="bg1"/>
-                </a:solidFill>
-              </a:rPr>
-              <a:t>Материалы для обучения</a:t>
-            </a:r>
-            <a:endParaRPr lang="en-US" dirty="0">
-              <a:solidFill>
-                <a:schemeClr val="bg1"/>
-              </a:solidFill>
-            </a:endParaRPr>
-          </a:p>
-        </p:txBody>
-      </p:sp>
-      <p:sp>
-        <p:nvSpPr>
-          <p:cNvPr id="3" name="Content Placeholder 2"/>
-          <p:cNvSpPr>
-            <a:spLocks noGrp="1"/>
-          </p:cNvSpPr>
-          <p:nvPr>
-            <p:ph idx="1"/>
-          </p:nvPr>
-        </p:nvSpPr>
-        <p:spPr/>
-        <p:txBody>
-          <a:bodyPr/>
-          <a:lstStyle/>
-          <a:p>
-            <a:r>
-              <a:rPr lang="en-US" dirty="0">
-                <a:solidFill>
-                  <a:schemeClr val="bg1"/>
-                </a:solidFill>
-                <a:hlinkClick r:id="rId2"/>
-              </a:rPr>
-              <a:t>https://</a:t>
-            </a:r>
-            <a:r>
-              <a:rPr lang="en-US" dirty="0" smtClean="0">
-                <a:solidFill>
-                  <a:schemeClr val="bg1"/>
-                </a:solidFill>
-                <a:hlinkClick r:id="rId2"/>
-              </a:rPr>
-              <a:t>github.com/bazile/Training</a:t>
-            </a:r>
-            <a:r>
-              <a:rPr lang="en-US" dirty="0" smtClean="0">
-                <a:solidFill>
-                  <a:schemeClr val="bg1"/>
-                </a:solidFill>
-              </a:rPr>
-              <a:t/>
-            </a:r>
-            <a:br>
-              <a:rPr lang="en-US" dirty="0" smtClean="0">
-                <a:solidFill>
-                  <a:schemeClr val="bg1"/>
-                </a:solidFill>
-              </a:rPr>
-            </a:br>
-            <a:r>
-              <a:rPr lang="ru-RU" dirty="0" smtClean="0">
-                <a:solidFill>
-                  <a:schemeClr val="bg1"/>
-                </a:solidFill>
-              </a:rPr>
-              <a:t>Презентации и примеры кода используемые во время занятия</a:t>
-            </a:r>
-          </a:p>
-          <a:p>
-            <a:endParaRPr lang="ru-RU" dirty="0" smtClean="0">
-              <a:solidFill>
-                <a:schemeClr val="bg1"/>
-              </a:solidFill>
-            </a:endParaRPr>
-          </a:p>
-          <a:p>
-            <a:r>
-              <a:rPr lang="en-US" dirty="0">
-                <a:solidFill>
-                  <a:schemeClr val="bg1"/>
-                </a:solidFill>
-                <a:hlinkClick r:id="rId3"/>
-              </a:rPr>
-              <a:t>http://belhard.nullptr.ru</a:t>
-            </a:r>
-            <a:r>
-              <a:rPr lang="en-US" dirty="0" smtClean="0">
-                <a:solidFill>
-                  <a:schemeClr val="bg1"/>
-                </a:solidFill>
-                <a:hlinkClick r:id="rId3"/>
-              </a:rPr>
-              <a:t>/</a:t>
-            </a:r>
-            <a:r>
-              <a:rPr lang="ru-RU" dirty="0" smtClean="0">
-                <a:solidFill>
-                  <a:schemeClr val="bg1"/>
-                </a:solidFill>
-              </a:rPr>
-              <a:t/>
-            </a:r>
-            <a:br>
-              <a:rPr lang="ru-RU" dirty="0" smtClean="0">
-                <a:solidFill>
-                  <a:schemeClr val="bg1"/>
-                </a:solidFill>
-              </a:rPr>
-            </a:br>
-            <a:r>
-              <a:rPr lang="ru-RU" dirty="0" smtClean="0">
-                <a:solidFill>
-                  <a:schemeClr val="bg1"/>
-                </a:solidFill>
-              </a:rPr>
-              <a:t>Книги, примеры к ним и другие полезные файлы.</a:t>
-            </a:r>
-            <a:endParaRPr lang="ru-RU" dirty="0">
-              <a:solidFill>
-                <a:schemeClr val="bg1"/>
-              </a:solidFill>
-            </a:endParaRPr>
-          </a:p>
-          <a:p>
-            <a:endParaRPr lang="en-US" dirty="0"/>
-          </a:p>
-        </p:txBody>
-      </p:sp>
-    </p:spTree>
-    <p:extLst>
-      <p:ext uri="{BB962C8B-B14F-4D97-AF65-F5344CB8AC3E}">
-        <p14:creationId xmlns:p14="http://schemas.microsoft.com/office/powerpoint/2010/main" val="1546001890"/>
-      </p:ext>
-    </p:extLst>
-  </p:cSld>
-  <p:clrMapOvr>
-    <a:masterClrMapping/>
-  </p:clrMapOvr>
-</p:sld>
-</file>
-
-<file path=ppt/slides/slide30.xml><?xml version="1.0" encoding="utf-8"?>
+<file path=ppt/slides/slide31.xml><?xml version="1.0" encoding="utf-8"?>
 <p:sld xmlns:a="http://schemas.openxmlformats.org/drawingml/2006/main" xmlns:r="http://schemas.openxmlformats.org/officeDocument/2006/relationships" xmlns:p="http://schemas.openxmlformats.org/presentationml/2006/main">
   <p:cSld>
     <p:spTree>
@@ -21437,7 +21578,7 @@
 </p:sld>
 </file>
 
-<file path=ppt/slides/slide31.xml><?xml version="1.0" encoding="utf-8"?>
+<file path=ppt/slides/slide32.xml><?xml version="1.0" encoding="utf-8"?>
 <p:sld xmlns:a="http://schemas.openxmlformats.org/drawingml/2006/main" xmlns:r="http://schemas.openxmlformats.org/officeDocument/2006/relationships" xmlns:p="http://schemas.openxmlformats.org/presentationml/2006/main">
   <p:cSld>
     <p:spTree>
@@ -22254,7 +22395,7 @@
 </p:sld>
 </file>
 
-<file path=ppt/slides/slide32.xml><?xml version="1.0" encoding="utf-8"?>
+<file path=ppt/slides/slide33.xml><?xml version="1.0" encoding="utf-8"?>
 <p:sld xmlns:a="http://schemas.openxmlformats.org/drawingml/2006/main" xmlns:r="http://schemas.openxmlformats.org/officeDocument/2006/relationships" xmlns:p="http://schemas.openxmlformats.org/presentationml/2006/main">
   <p:cSld>
     <p:spTree>
@@ -22427,7 +22568,7 @@
 </p:sld>
 </file>
 
-<file path=ppt/slides/slide33.xml><?xml version="1.0" encoding="utf-8"?>
+<file path=ppt/slides/slide34.xml><?xml version="1.0" encoding="utf-8"?>
 <p:sld xmlns:a="http://schemas.openxmlformats.org/drawingml/2006/main" xmlns:r="http://schemas.openxmlformats.org/officeDocument/2006/relationships" xmlns:p="http://schemas.openxmlformats.org/presentationml/2006/main">
   <p:cSld>
     <p:spTree>
@@ -23511,7 +23652,7 @@
 </p:sld>
 </file>
 
-<file path=ppt/slides/slide34.xml><?xml version="1.0" encoding="utf-8"?>
+<file path=ppt/slides/slide35.xml><?xml version="1.0" encoding="utf-8"?>
 <p:sld xmlns:a="http://schemas.openxmlformats.org/drawingml/2006/main" xmlns:r="http://schemas.openxmlformats.org/officeDocument/2006/relationships" xmlns:p="http://schemas.openxmlformats.org/presentationml/2006/main">
   <p:cSld>
     <p:spTree>
@@ -23766,144 +23907,6 @@
     <p:extLst>
       <p:ext uri="{BB962C8B-B14F-4D97-AF65-F5344CB8AC3E}">
         <p14:creationId xmlns:p14="http://schemas.microsoft.com/office/powerpoint/2010/main" val="81987321"/>
-      </p:ext>
-    </p:extLst>
-  </p:cSld>
-  <p:clrMapOvr>
-    <a:masterClrMapping/>
-  </p:clrMapOvr>
-  <p:timing>
-    <p:tnLst>
-      <p:par>
-        <p:cTn id="1" dur="indefinite" restart="never" nodeType="tmRoot"/>
-      </p:par>
-    </p:tnLst>
-  </p:timing>
-</p:sld>
-</file>
-
-<file path=ppt/slides/slide35.xml><?xml version="1.0" encoding="utf-8"?>
-<p:sld xmlns:a="http://schemas.openxmlformats.org/drawingml/2006/main" xmlns:r="http://schemas.openxmlformats.org/officeDocument/2006/relationships" xmlns:p="http://schemas.openxmlformats.org/presentationml/2006/main">
-  <p:cSld>
-    <p:spTree>
-      <p:nvGrpSpPr>
-        <p:cNvPr id="1" name=""/>
-        <p:cNvGrpSpPr/>
-        <p:nvPr/>
-      </p:nvGrpSpPr>
-      <p:grpSpPr>
-        <a:xfrm>
-          <a:off x="0" y="0"/>
-          <a:ext cx="0" cy="0"/>
-          <a:chOff x="0" y="0"/>
-          <a:chExt cx="0" cy="0"/>
-        </a:xfrm>
-      </p:grpSpPr>
-      <p:sp>
-        <p:nvSpPr>
-          <p:cNvPr id="2" name="TextBox 1"/>
-          <p:cNvSpPr txBox="1"/>
-          <p:nvPr/>
-        </p:nvSpPr>
-        <p:spPr>
-          <a:xfrm>
-            <a:off x="323528" y="764704"/>
-            <a:ext cx="8424936" cy="1938992"/>
-          </a:xfrm>
-          <a:prstGeom prst="rect">
-            <a:avLst/>
-          </a:prstGeom>
-          <a:noFill/>
-        </p:spPr>
-        <p:txBody>
-          <a:bodyPr wrap="square" rtlCol="0">
-            <a:spAutoFit/>
-          </a:bodyPr>
-          <a:lstStyle/>
-          <a:p>
-            <a:r>
-              <a:rPr lang="ru-RU" sz="2400" dirty="0" smtClean="0"/>
-              <a:t>Набор классов предназначенных для облегчения многопоточного программирования. Представлены в </a:t>
-            </a:r>
-            <a:r>
-              <a:rPr lang="en-US" sz="2400" dirty="0" smtClean="0"/>
-              <a:t>.NET 4. </a:t>
-            </a:r>
-            <a:r>
-              <a:rPr lang="ru-RU" sz="2400" dirty="0" smtClean="0"/>
-              <a:t>Пространство имен - </a:t>
-            </a:r>
-            <a:r>
-              <a:rPr lang="en-US" sz="2400" dirty="0" err="1" smtClean="0"/>
-              <a:t>System.Threading.Tasks</a:t>
-            </a:r>
-            <a:r>
-              <a:rPr lang="ru-RU" sz="2400" dirty="0" smtClean="0"/>
-              <a:t>.</a:t>
-            </a:r>
-          </a:p>
-          <a:p>
-            <a:endParaRPr lang="ru-RU" sz="2400" dirty="0"/>
-          </a:p>
-          <a:p>
-            <a:r>
-              <a:rPr lang="ru-RU" sz="2400" dirty="0" smtClean="0"/>
-              <a:t>Классы: </a:t>
-            </a:r>
-            <a:r>
-              <a:rPr lang="en-US" sz="2400" dirty="0" smtClean="0"/>
-              <a:t>Parallel, Task, </a:t>
-            </a:r>
-            <a:r>
-              <a:rPr lang="en-US" sz="2400" dirty="0" err="1" smtClean="0"/>
-              <a:t>TaskFactory</a:t>
-            </a:r>
-            <a:r>
-              <a:rPr lang="en-US" sz="2400" dirty="0" smtClean="0"/>
-              <a:t> </a:t>
-            </a:r>
-            <a:r>
-              <a:rPr lang="ru-RU" sz="2400" dirty="0" smtClean="0"/>
-              <a:t>и другие.</a:t>
-            </a:r>
-            <a:endParaRPr lang="en-US" sz="2400" dirty="0" smtClean="0"/>
-          </a:p>
-        </p:txBody>
-      </p:sp>
-      <p:sp>
-        <p:nvSpPr>
-          <p:cNvPr id="3" name="TextBox 2"/>
-          <p:cNvSpPr txBox="1"/>
-          <p:nvPr/>
-        </p:nvSpPr>
-        <p:spPr>
-          <a:xfrm>
-            <a:off x="251520" y="44624"/>
-            <a:ext cx="8568952" cy="584775"/>
-          </a:xfrm>
-          <a:prstGeom prst="rect">
-            <a:avLst/>
-          </a:prstGeom>
-          <a:noFill/>
-        </p:spPr>
-        <p:txBody>
-          <a:bodyPr wrap="square" rtlCol="0">
-            <a:spAutoFit/>
-          </a:bodyPr>
-          <a:lstStyle/>
-          <a:p>
-            <a:pPr algn="ctr"/>
-            <a:r>
-              <a:rPr lang="en-US" sz="3200" dirty="0" smtClean="0"/>
-              <a:t>Task Parallel Library (TPL)</a:t>
-            </a:r>
-          </a:p>
-        </p:txBody>
-      </p:sp>
-    </p:spTree>
-    <p:extLst>
-      <p:ext uri="{BB962C8B-B14F-4D97-AF65-F5344CB8AC3E}">
-        <p14:creationId xmlns:p14="http://schemas.microsoft.com/office/powerpoint/2010/main" val="3772773505"/>
       </p:ext>
     </p:extLst>
   </p:cSld>
@@ -23960,43 +23963,41 @@
           <a:lstStyle/>
           <a:p>
             <a:r>
-              <a:rPr lang="en-US" sz="2400" dirty="0"/>
-              <a:t>v</a:t>
+              <a:rPr lang="ru-RU" sz="2400" dirty="0" smtClean="0"/>
+              <a:t>Набор классов предназначенных для облегчения многопоточного программирования. Представлены в </a:t>
             </a:r>
             <a:r>
               <a:rPr lang="en-US" sz="2400" dirty="0" smtClean="0"/>
-              <a:t>olatile</a:t>
-            </a:r>
-          </a:p>
-          <a:p>
-            <a:endParaRPr lang="en-US" sz="2400" dirty="0"/>
-          </a:p>
-          <a:p>
+              <a:t>.NET 4. </a:t>
+            </a:r>
+            <a:r>
+              <a:rPr lang="ru-RU" sz="2400" dirty="0" smtClean="0"/>
+              <a:t>Пространство имен - </a:t>
+            </a:r>
             <a:r>
               <a:rPr lang="en-US" sz="2400" dirty="0" err="1" smtClean="0"/>
-              <a:t>async</a:t>
+              <a:t>System.Threading.Tasks</a:t>
+            </a:r>
+            <a:r>
+              <a:rPr lang="ru-RU" sz="2400" dirty="0" smtClean="0"/>
+              <a:t>.</a:t>
+            </a:r>
+          </a:p>
+          <a:p>
+            <a:endParaRPr lang="ru-RU" sz="2400" dirty="0"/>
+          </a:p>
+          <a:p>
+            <a:r>
+              <a:rPr lang="ru-RU" sz="2400" dirty="0" smtClean="0"/>
+              <a:t>Классы: </a:t>
             </a:r>
             <a:r>
               <a:rPr lang="en-US" sz="2400" dirty="0" smtClean="0"/>
-              <a:t>/await - .NET 4.5</a:t>
-            </a:r>
-          </a:p>
-          <a:p>
-            <a:r>
-              <a:rPr lang="ru-RU" sz="2400" dirty="0" smtClean="0"/>
-              <a:t>Для их использования в предыдущих версиях </a:t>
-            </a:r>
-            <a:r>
-              <a:rPr lang="en-US" sz="2400" dirty="0" smtClean="0"/>
-              <a:t>.NET </a:t>
-            </a:r>
-            <a:r>
-              <a:rPr lang="ru-RU" sz="2400" dirty="0" smtClean="0"/>
-              <a:t>нужен </a:t>
+              <a:t>Parallel, Task, </a:t>
             </a:r>
             <a:r>
               <a:rPr lang="en-US" sz="2400" dirty="0" err="1" smtClean="0"/>
-              <a:t>NuGet</a:t>
+              <a:t>TaskFactory</a:t>
             </a:r>
             <a:r>
               <a:rPr lang="en-US" sz="2400" dirty="0" smtClean="0"/>
@@ -24004,11 +24005,7 @@
             </a:r>
             <a:r>
               <a:rPr lang="ru-RU" sz="2400" dirty="0" smtClean="0"/>
-              <a:t>пакет </a:t>
-            </a:r>
-            <a:r>
-              <a:rPr lang="en-US" sz="2400" dirty="0" err="1" smtClean="0"/>
-              <a:t>Microsoft.Bcl.Async</a:t>
+              <a:t>и другие.</a:t>
             </a:r>
             <a:endParaRPr lang="en-US" sz="2400" dirty="0" smtClean="0"/>
           </a:p>
@@ -24038,17 +24035,16 @@
           <a:p>
             <a:pPr algn="ctr"/>
             <a:r>
-              <a:rPr lang="ru-RU" sz="3200" dirty="0" smtClean="0"/>
-              <a:t>Ключевые слова</a:t>
-            </a:r>
-            <a:endParaRPr lang="en-US" sz="3200" dirty="0" smtClean="0"/>
+              <a:rPr lang="en-US" sz="3200" dirty="0" smtClean="0"/>
+              <a:t>Task Parallel Library (TPL)</a:t>
+            </a:r>
           </a:p>
         </p:txBody>
       </p:sp>
     </p:spTree>
     <p:extLst>
       <p:ext uri="{BB962C8B-B14F-4D97-AF65-F5344CB8AC3E}">
-        <p14:creationId xmlns:p14="http://schemas.microsoft.com/office/powerpoint/2010/main" val="2729432619"/>
+        <p14:creationId xmlns:p14="http://schemas.microsoft.com/office/powerpoint/2010/main" val="3772773505"/>
       </p:ext>
     </p:extLst>
   </p:cSld>
@@ -24091,6 +24087,151 @@
         <p:spPr>
           <a:xfrm>
             <a:off x="323528" y="764704"/>
+            <a:ext cx="8424936" cy="1938992"/>
+          </a:xfrm>
+          <a:prstGeom prst="rect">
+            <a:avLst/>
+          </a:prstGeom>
+          <a:noFill/>
+        </p:spPr>
+        <p:txBody>
+          <a:bodyPr wrap="square" rtlCol="0">
+            <a:spAutoFit/>
+          </a:bodyPr>
+          <a:lstStyle/>
+          <a:p>
+            <a:r>
+              <a:rPr lang="en-US" sz="2400" dirty="0"/>
+              <a:t>v</a:t>
+            </a:r>
+            <a:r>
+              <a:rPr lang="en-US" sz="2400" dirty="0" smtClean="0"/>
+              <a:t>olatile</a:t>
+            </a:r>
+          </a:p>
+          <a:p>
+            <a:endParaRPr lang="en-US" sz="2400" dirty="0"/>
+          </a:p>
+          <a:p>
+            <a:r>
+              <a:rPr lang="en-US" sz="2400" dirty="0" err="1" smtClean="0"/>
+              <a:t>async</a:t>
+            </a:r>
+            <a:r>
+              <a:rPr lang="en-US" sz="2400" dirty="0" smtClean="0"/>
+              <a:t>/await - .NET 4.5</a:t>
+            </a:r>
+          </a:p>
+          <a:p>
+            <a:r>
+              <a:rPr lang="ru-RU" sz="2400" dirty="0" smtClean="0"/>
+              <a:t>Для их использования в предыдущих версиях </a:t>
+            </a:r>
+            <a:r>
+              <a:rPr lang="en-US" sz="2400" dirty="0" smtClean="0"/>
+              <a:t>.NET </a:t>
+            </a:r>
+            <a:r>
+              <a:rPr lang="ru-RU" sz="2400" dirty="0" smtClean="0"/>
+              <a:t>нужен </a:t>
+            </a:r>
+            <a:r>
+              <a:rPr lang="en-US" sz="2400" dirty="0" err="1" smtClean="0"/>
+              <a:t>NuGet</a:t>
+            </a:r>
+            <a:r>
+              <a:rPr lang="en-US" sz="2400" dirty="0" smtClean="0"/>
+              <a:t> </a:t>
+            </a:r>
+            <a:r>
+              <a:rPr lang="ru-RU" sz="2400" dirty="0" smtClean="0"/>
+              <a:t>пакет </a:t>
+            </a:r>
+            <a:r>
+              <a:rPr lang="en-US" sz="2400" dirty="0" err="1" smtClean="0"/>
+              <a:t>Microsoft.Bcl.Async</a:t>
+            </a:r>
+            <a:endParaRPr lang="en-US" sz="2400" dirty="0" smtClean="0"/>
+          </a:p>
+        </p:txBody>
+      </p:sp>
+      <p:sp>
+        <p:nvSpPr>
+          <p:cNvPr id="3" name="TextBox 2"/>
+          <p:cNvSpPr txBox="1"/>
+          <p:nvPr/>
+        </p:nvSpPr>
+        <p:spPr>
+          <a:xfrm>
+            <a:off x="251520" y="44624"/>
+            <a:ext cx="8568952" cy="584775"/>
+          </a:xfrm>
+          <a:prstGeom prst="rect">
+            <a:avLst/>
+          </a:prstGeom>
+          <a:noFill/>
+        </p:spPr>
+        <p:txBody>
+          <a:bodyPr wrap="square" rtlCol="0">
+            <a:spAutoFit/>
+          </a:bodyPr>
+          <a:lstStyle/>
+          <a:p>
+            <a:pPr algn="ctr"/>
+            <a:r>
+              <a:rPr lang="ru-RU" sz="3200" dirty="0" smtClean="0"/>
+              <a:t>Ключевые слова</a:t>
+            </a:r>
+            <a:endParaRPr lang="en-US" sz="3200" dirty="0" smtClean="0"/>
+          </a:p>
+        </p:txBody>
+      </p:sp>
+    </p:spTree>
+    <p:extLst>
+      <p:ext uri="{BB962C8B-B14F-4D97-AF65-F5344CB8AC3E}">
+        <p14:creationId xmlns:p14="http://schemas.microsoft.com/office/powerpoint/2010/main" val="2729432619"/>
+      </p:ext>
+    </p:extLst>
+  </p:cSld>
+  <p:clrMapOvr>
+    <a:masterClrMapping/>
+  </p:clrMapOvr>
+  <p:timing>
+    <p:tnLst>
+      <p:par>
+        <p:cTn id="1" dur="indefinite" restart="never" nodeType="tmRoot"/>
+      </p:par>
+    </p:tnLst>
+  </p:timing>
+</p:sld>
+</file>
+
+<file path=ppt/slides/slide38.xml><?xml version="1.0" encoding="utf-8"?>
+<p:sld xmlns:a="http://schemas.openxmlformats.org/drawingml/2006/main" xmlns:r="http://schemas.openxmlformats.org/officeDocument/2006/relationships" xmlns:p="http://schemas.openxmlformats.org/presentationml/2006/main">
+  <p:cSld>
+    <p:spTree>
+      <p:nvGrpSpPr>
+        <p:cNvPr id="1" name=""/>
+        <p:cNvGrpSpPr/>
+        <p:nvPr/>
+      </p:nvGrpSpPr>
+      <p:grpSpPr>
+        <a:xfrm>
+          <a:off x="0" y="0"/>
+          <a:ext cx="0" cy="0"/>
+          <a:chOff x="0" y="0"/>
+          <a:chExt cx="0" cy="0"/>
+        </a:xfrm>
+      </p:grpSpPr>
+      <p:sp>
+        <p:nvSpPr>
+          <p:cNvPr id="2" name="TextBox 1"/>
+          <p:cNvSpPr txBox="1"/>
+          <p:nvPr/>
+        </p:nvSpPr>
+        <p:spPr>
+          <a:xfrm>
+            <a:off x="323528" y="764704"/>
             <a:ext cx="8424936" cy="5632311"/>
           </a:xfrm>
           <a:prstGeom prst="rect">
@@ -24400,7 +24541,7 @@
 </p:sld>
 </file>
 
-<file path=ppt/slides/slide38.xml><?xml version="1.0" encoding="utf-8"?>
+<file path=ppt/slides/slide39.xml><?xml version="1.0" encoding="utf-8"?>
 <p:sld xmlns:a="http://schemas.openxmlformats.org/drawingml/2006/main" xmlns:r="http://schemas.openxmlformats.org/officeDocument/2006/relationships" xmlns:p="http://schemas.openxmlformats.org/presentationml/2006/main">
   <p:cSld>
     <p:bg>

</xml_diff>

<commit_message>
More C# 6 features
</commit_message>
<xml_diff>
--- a/Presentation/lesson-08-multithreading.pptx
+++ b/Presentation/lesson-08-multithreading.pptx
@@ -6,7 +6,7 @@
     <p:sldMasterId id="2147483663" r:id="rId2"/>
   </p:sldMasterIdLst>
   <p:notesMasterIdLst>
-    <p:notesMasterId r:id="rId47"/>
+    <p:notesMasterId r:id="rId48"/>
   </p:notesMasterIdLst>
   <p:sldIdLst>
     <p:sldId id="256" r:id="rId3"/>
@@ -51,8 +51,9 @@
     <p:sldId id="282" r:id="rId42"/>
     <p:sldId id="279" r:id="rId43"/>
     <p:sldId id="280" r:id="rId44"/>
-    <p:sldId id="276" r:id="rId45"/>
-    <p:sldId id="291" r:id="rId46"/>
+    <p:sldId id="302" r:id="rId45"/>
+    <p:sldId id="276" r:id="rId46"/>
+    <p:sldId id="291" r:id="rId47"/>
   </p:sldIdLst>
   <p:sldSz cx="9144000" cy="6858000" type="screen4x3"/>
   <p:notesSz cx="6858000" cy="9144000"/>
@@ -237,7 +238,7 @@
             <a:fld id="{B24A7054-7FFB-49F4-A126-5DF6E687FF53}" type="datetimeFigureOut">
               <a:rPr lang="ru-RU" smtClean="0"/>
               <a:pPr/>
-              <a:t>20.09.2014</a:t>
+              <a:t>12.10.2014</a:t>
             </a:fld>
             <a:endParaRPr lang="ru-RU" dirty="0"/>
           </a:p>
@@ -1521,7 +1522,7 @@
             <a:fld id="{8E6E6A2A-E9D3-4A0D-B04A-ABDD367A1E08}" type="datetimeFigureOut">
               <a:rPr lang="ru-RU" smtClean="0"/>
               <a:pPr/>
-              <a:t>20.09.2014</a:t>
+              <a:t>12.10.2014</a:t>
             </a:fld>
             <a:endParaRPr lang="ru-RU" dirty="0"/>
           </a:p>
@@ -1771,7 +1772,7 @@
                 </a:solidFill>
               </a:rPr>
               <a:pPr/>
-              <a:t>9/20/2014</a:t>
+              <a:t>10/12/2014</a:t>
             </a:fld>
             <a:endParaRPr lang="en-US" dirty="0">
               <a:solidFill>
@@ -1973,7 +1974,7 @@
                 </a:solidFill>
               </a:rPr>
               <a:pPr/>
-              <a:t>9/20/2014</a:t>
+              <a:t>10/12/2014</a:t>
             </a:fld>
             <a:endParaRPr lang="en-US" dirty="0">
               <a:solidFill>
@@ -2251,7 +2252,7 @@
                 </a:solidFill>
               </a:rPr>
               <a:pPr/>
-              <a:t>9/20/2014</a:t>
+              <a:t>10/12/2014</a:t>
             </a:fld>
             <a:endParaRPr lang="en-US" dirty="0">
               <a:solidFill>
@@ -2571,7 +2572,7 @@
                 </a:solidFill>
               </a:rPr>
               <a:pPr/>
-              <a:t>9/20/2014</a:t>
+              <a:t>10/12/2014</a:t>
             </a:fld>
             <a:endParaRPr lang="en-US" dirty="0">
               <a:solidFill>
@@ -3025,7 +3026,7 @@
                 </a:solidFill>
               </a:rPr>
               <a:pPr/>
-              <a:t>9/20/2014</a:t>
+              <a:t>10/12/2014</a:t>
             </a:fld>
             <a:endParaRPr lang="en-US" dirty="0">
               <a:solidFill>
@@ -3384,7 +3385,7 @@
                 </a:solidFill>
               </a:rPr>
               <a:pPr/>
-              <a:t>9/20/2014</a:t>
+              <a:t>10/12/2014</a:t>
             </a:fld>
             <a:endParaRPr lang="en-US" dirty="0">
               <a:solidFill>
@@ -3511,7 +3512,7 @@
                 </a:solidFill>
               </a:rPr>
               <a:pPr/>
-              <a:t>9/20/2014</a:t>
+              <a:t>10/12/2014</a:t>
             </a:fld>
             <a:endParaRPr lang="en-US" dirty="0">
               <a:solidFill>
@@ -3820,7 +3821,7 @@
                 </a:solidFill>
               </a:rPr>
               <a:pPr/>
-              <a:t>9/20/2014</a:t>
+              <a:t>10/12/2014</a:t>
             </a:fld>
             <a:endParaRPr lang="en-US" dirty="0">
               <a:solidFill>
@@ -4105,7 +4106,7 @@
                 </a:solidFill>
               </a:rPr>
               <a:pPr/>
-              <a:t>9/20/2014</a:t>
+              <a:t>10/12/2014</a:t>
             </a:fld>
             <a:endParaRPr lang="en-US" dirty="0">
               <a:solidFill>
@@ -4307,7 +4308,7 @@
                 </a:solidFill>
               </a:rPr>
               <a:pPr/>
-              <a:t>9/20/2014</a:t>
+              <a:t>10/12/2014</a:t>
             </a:fld>
             <a:endParaRPr lang="en-US" dirty="0">
               <a:solidFill>
@@ -4519,7 +4520,7 @@
                 </a:solidFill>
               </a:rPr>
               <a:pPr/>
-              <a:t>9/20/2014</a:t>
+              <a:t>10/12/2014</a:t>
             </a:fld>
             <a:endParaRPr lang="en-US" dirty="0">
               <a:solidFill>
@@ -5781,7 +5782,7 @@
             <a:fld id="{AC3D3127-B7C4-45E3-9797-C527EC9FDD78}" type="datetimeFigureOut">
               <a:rPr lang="ru-RU" smtClean="0"/>
               <a:pPr/>
-              <a:t>20.09.2014</a:t>
+              <a:t>12.10.2014</a:t>
             </a:fld>
             <a:endParaRPr lang="ru-RU" dirty="0"/>
           </a:p>
@@ -6309,7 +6310,7 @@
                 </a:solidFill>
               </a:rPr>
               <a:pPr/>
-              <a:t>9/20/2014</a:t>
+              <a:t>10/12/2014</a:t>
             </a:fld>
             <a:endParaRPr lang="en-US" dirty="0">
               <a:solidFill>
@@ -11833,11 +11834,7 @@
             </a:r>
             <a:r>
               <a:rPr lang="ru-RU" sz="2400" b="1" dirty="0" smtClean="0"/>
-              <a:t>к</a:t>
-            </a:r>
-            <a:r>
-              <a:rPr lang="ru-RU" sz="2400" b="1" dirty="0" smtClean="0"/>
-              <a:t>ласса </a:t>
+              <a:t>класса </a:t>
             </a:r>
             <a:r>
               <a:rPr lang="en-US" sz="2400" b="1" dirty="0" smtClean="0"/>
@@ -11911,11 +11908,7 @@
             </a:r>
             <a:r>
               <a:rPr lang="ru-RU" sz="1600" dirty="0" smtClean="0"/>
-              <a:t> </a:t>
-            </a:r>
-            <a:r>
-              <a:rPr lang="ru-RU" sz="1600" dirty="0" smtClean="0"/>
-              <a:t>очень полезно при отладке.</a:t>
+              <a:t> очень полезно при отладке.</a:t>
             </a:r>
             <a:r>
               <a:rPr lang="en-US" sz="1600" dirty="0" smtClean="0"/>
@@ -25177,6 +25170,115 @@
 </file>
 
 <file path=ppt/slides/slide43.xml><?xml version="1.0" encoding="utf-8"?>
+<p:sld xmlns:a="http://schemas.openxmlformats.org/drawingml/2006/main" xmlns:r="http://schemas.openxmlformats.org/officeDocument/2006/relationships" xmlns:p="http://schemas.openxmlformats.org/presentationml/2006/main" show="0">
+  <p:cSld>
+    <p:bg>
+      <p:bgPr>
+        <a:solidFill>
+          <a:srgbClr val="C00000"/>
+        </a:solidFill>
+        <a:effectLst/>
+      </p:bgPr>
+    </p:bg>
+    <p:spTree>
+      <p:nvGrpSpPr>
+        <p:cNvPr id="1" name=""/>
+        <p:cNvGrpSpPr/>
+        <p:nvPr/>
+      </p:nvGrpSpPr>
+      <p:grpSpPr>
+        <a:xfrm>
+          <a:off x="0" y="0"/>
+          <a:ext cx="0" cy="0"/>
+          <a:chOff x="0" y="0"/>
+          <a:chExt cx="0" cy="0"/>
+        </a:xfrm>
+      </p:grpSpPr>
+      <p:sp>
+        <p:nvSpPr>
+          <p:cNvPr id="2" name="Title 1"/>
+          <p:cNvSpPr>
+            <a:spLocks noGrp="1"/>
+          </p:cNvSpPr>
+          <p:nvPr>
+            <p:ph type="title"/>
+          </p:nvPr>
+        </p:nvSpPr>
+        <p:spPr/>
+        <p:txBody>
+          <a:bodyPr/>
+          <a:lstStyle/>
+          <a:p>
+            <a:r>
+              <a:rPr lang="en-US" dirty="0" smtClean="0"/>
+              <a:t>C# 6. await in try/catch</a:t>
+            </a:r>
+            <a:endParaRPr lang="ru-RU" dirty="0"/>
+          </a:p>
+        </p:txBody>
+      </p:sp>
+      <p:sp>
+        <p:nvSpPr>
+          <p:cNvPr id="3" name="Content Placeholder 2"/>
+          <p:cNvSpPr>
+            <a:spLocks noGrp="1"/>
+          </p:cNvSpPr>
+          <p:nvPr>
+            <p:ph idx="1"/>
+          </p:nvPr>
+        </p:nvSpPr>
+        <p:spPr/>
+        <p:txBody>
+          <a:bodyPr/>
+          <a:lstStyle/>
+          <a:p>
+            <a:pPr marL="0" indent="0">
+              <a:buNone/>
+            </a:pPr>
+            <a:r>
+              <a:rPr lang="en-US" dirty="0">
+                <a:hlinkClick r:id="rId2"/>
+              </a:rPr>
+              <a:t>http://</a:t>
+            </a:r>
+            <a:r>
+              <a:rPr lang="en-US" dirty="0" smtClean="0">
+                <a:hlinkClick r:id="rId2"/>
+              </a:rPr>
+              <a:t>msdn.microsoft.com/en-us/magazine/dn683793.aspx</a:t>
+            </a:r>
+            <a:endParaRPr lang="en-US" dirty="0" smtClean="0"/>
+          </a:p>
+          <a:p>
+            <a:pPr marL="0" indent="0">
+              <a:buNone/>
+            </a:pPr>
+            <a:endParaRPr lang="ru-RU" dirty="0"/>
+          </a:p>
+        </p:txBody>
+      </p:sp>
+    </p:spTree>
+    <p:extLst>
+      <p:ext uri="{BB962C8B-B14F-4D97-AF65-F5344CB8AC3E}">
+        <p14:creationId xmlns:p14="http://schemas.microsoft.com/office/powerpoint/2010/main" val="2475066939"/>
+      </p:ext>
+    </p:extLst>
+  </p:cSld>
+  <p:clrMapOvr>
+    <a:masterClrMapping/>
+  </p:clrMapOvr>
+  <mc:AlternateContent xmlns:mc="http://schemas.openxmlformats.org/markup-compatibility/2006">
+    <mc:Choice xmlns:p14="http://schemas.microsoft.com/office/powerpoint/2010/main" Requires="p14">
+      <p:transition spd="slow" p14:dur="2000"/>
+    </mc:Choice>
+    <mc:Fallback>
+      <p:transition spd="slow"/>
+    </mc:Fallback>
+  </mc:AlternateContent>
+</p:sld>
+</file>
+
+<file path=ppt/slides/slide44.xml><?xml version="1.0" encoding="utf-8"?>
 <p:sld xmlns:a="http://schemas.openxmlformats.org/drawingml/2006/main" xmlns:r="http://schemas.openxmlformats.org/officeDocument/2006/relationships" xmlns:p="http://schemas.openxmlformats.org/presentationml/2006/main">
   <p:cSld>
     <p:spTree>
@@ -25495,7 +25597,7 @@
 </p:sld>
 </file>
 
-<file path=ppt/slides/slide44.xml><?xml version="1.0" encoding="utf-8"?>
+<file path=ppt/slides/slide45.xml><?xml version="1.0" encoding="utf-8"?>
 <p:sld xmlns:a="http://schemas.openxmlformats.org/drawingml/2006/main" xmlns:r="http://schemas.openxmlformats.org/officeDocument/2006/relationships" xmlns:p="http://schemas.openxmlformats.org/presentationml/2006/main">
   <p:cSld>
     <p:bg>

</xml_diff>

<commit_message>
Avoid using CheckForIllegalCrossThreadCalls = false
</commit_message>
<xml_diff>
--- a/Presentation/lesson-08-multithreading.pptx
+++ b/Presentation/lesson-08-multithreading.pptx
@@ -238,7 +238,7 @@
             <a:fld id="{B24A7054-7FFB-49F4-A126-5DF6E687FF53}" type="datetimeFigureOut">
               <a:rPr lang="ru-RU" smtClean="0"/>
               <a:pPr/>
-              <a:t>12.10.2014</a:t>
+              <a:t>06.12.2014</a:t>
             </a:fld>
             <a:endParaRPr lang="ru-RU" dirty="0"/>
           </a:p>
@@ -1522,7 +1522,7 @@
             <a:fld id="{8E6E6A2A-E9D3-4A0D-B04A-ABDD367A1E08}" type="datetimeFigureOut">
               <a:rPr lang="ru-RU" smtClean="0"/>
               <a:pPr/>
-              <a:t>12.10.2014</a:t>
+              <a:t>06.12.2014</a:t>
             </a:fld>
             <a:endParaRPr lang="ru-RU" dirty="0"/>
           </a:p>
@@ -1772,7 +1772,7 @@
                 </a:solidFill>
               </a:rPr>
               <a:pPr/>
-              <a:t>10/12/2014</a:t>
+              <a:t>12/6/2014</a:t>
             </a:fld>
             <a:endParaRPr lang="en-US" dirty="0">
               <a:solidFill>
@@ -1974,7 +1974,7 @@
                 </a:solidFill>
               </a:rPr>
               <a:pPr/>
-              <a:t>10/12/2014</a:t>
+              <a:t>12/6/2014</a:t>
             </a:fld>
             <a:endParaRPr lang="en-US" dirty="0">
               <a:solidFill>
@@ -2252,7 +2252,7 @@
                 </a:solidFill>
               </a:rPr>
               <a:pPr/>
-              <a:t>10/12/2014</a:t>
+              <a:t>12/6/2014</a:t>
             </a:fld>
             <a:endParaRPr lang="en-US" dirty="0">
               <a:solidFill>
@@ -2572,7 +2572,7 @@
                 </a:solidFill>
               </a:rPr>
               <a:pPr/>
-              <a:t>10/12/2014</a:t>
+              <a:t>12/6/2014</a:t>
             </a:fld>
             <a:endParaRPr lang="en-US" dirty="0">
               <a:solidFill>
@@ -3026,7 +3026,7 @@
                 </a:solidFill>
               </a:rPr>
               <a:pPr/>
-              <a:t>10/12/2014</a:t>
+              <a:t>12/6/2014</a:t>
             </a:fld>
             <a:endParaRPr lang="en-US" dirty="0">
               <a:solidFill>
@@ -3385,7 +3385,7 @@
                 </a:solidFill>
               </a:rPr>
               <a:pPr/>
-              <a:t>10/12/2014</a:t>
+              <a:t>12/6/2014</a:t>
             </a:fld>
             <a:endParaRPr lang="en-US" dirty="0">
               <a:solidFill>
@@ -3512,7 +3512,7 @@
                 </a:solidFill>
               </a:rPr>
               <a:pPr/>
-              <a:t>10/12/2014</a:t>
+              <a:t>12/6/2014</a:t>
             </a:fld>
             <a:endParaRPr lang="en-US" dirty="0">
               <a:solidFill>
@@ -3821,7 +3821,7 @@
                 </a:solidFill>
               </a:rPr>
               <a:pPr/>
-              <a:t>10/12/2014</a:t>
+              <a:t>12/6/2014</a:t>
             </a:fld>
             <a:endParaRPr lang="en-US" dirty="0">
               <a:solidFill>
@@ -4106,7 +4106,7 @@
                 </a:solidFill>
               </a:rPr>
               <a:pPr/>
-              <a:t>10/12/2014</a:t>
+              <a:t>12/6/2014</a:t>
             </a:fld>
             <a:endParaRPr lang="en-US" dirty="0">
               <a:solidFill>
@@ -4308,7 +4308,7 @@
                 </a:solidFill>
               </a:rPr>
               <a:pPr/>
-              <a:t>10/12/2014</a:t>
+              <a:t>12/6/2014</a:t>
             </a:fld>
             <a:endParaRPr lang="en-US" dirty="0">
               <a:solidFill>
@@ -4520,7 +4520,7 @@
                 </a:solidFill>
               </a:rPr>
               <a:pPr/>
-              <a:t>10/12/2014</a:t>
+              <a:t>12/6/2014</a:t>
             </a:fld>
             <a:endParaRPr lang="en-US" dirty="0">
               <a:solidFill>
@@ -5782,7 +5782,7 @@
             <a:fld id="{AC3D3127-B7C4-45E3-9797-C527EC9FDD78}" type="datetimeFigureOut">
               <a:rPr lang="ru-RU" smtClean="0"/>
               <a:pPr/>
-              <a:t>12.10.2014</a:t>
+              <a:t>06.12.2014</a:t>
             </a:fld>
             <a:endParaRPr lang="ru-RU" dirty="0"/>
           </a:p>
@@ -6310,7 +6310,7 @@
                 </a:solidFill>
               </a:rPr>
               <a:pPr/>
-              <a:t>10/12/2014</a:t>
+              <a:t>12/6/2014</a:t>
             </a:fld>
             <a:endParaRPr lang="en-US" dirty="0">
               <a:solidFill>
@@ -15478,7 +15478,7 @@
         <p:spPr/>
         <p:txBody>
           <a:bodyPr>
-            <a:normAutofit/>
+            <a:normAutofit fontScale="92500" lnSpcReduction="20000"/>
           </a:bodyPr>
           <a:lstStyle/>
           <a:p>
@@ -15540,8 +15540,53 @@
           <a:p>
             <a:r>
               <a:rPr lang="en-US" sz="2800" dirty="0" smtClean="0"/>
-              <a:t>[WPF] System.Windows.Threading.DispatcherTimer</a:t>
-            </a:r>
+              <a:t>[WPF] </a:t>
+            </a:r>
+            <a:r>
+              <a:rPr lang="en-US" sz="2800" dirty="0" err="1" smtClean="0"/>
+              <a:t>System.Windows.Threading.DispatcherTimer</a:t>
+            </a:r>
+            <a:endParaRPr lang="en-US" sz="2800" dirty="0" smtClean="0"/>
+          </a:p>
+          <a:p>
+            <a:pPr marL="0" indent="0">
+              <a:buNone/>
+            </a:pPr>
+            <a:endParaRPr lang="ru-RU" sz="2800" dirty="0" smtClean="0"/>
+          </a:p>
+          <a:p>
+            <a:pPr marL="0" indent="0">
+              <a:buNone/>
+            </a:pPr>
+            <a:r>
+              <a:rPr lang="ru-RU" sz="2800" dirty="0" smtClean="0"/>
+              <a:t>НЕ используйте </a:t>
+            </a:r>
+            <a:r>
+              <a:rPr lang="en-US" sz="2800" dirty="0" err="1" smtClean="0"/>
+              <a:t>Control.CheckForIllegalCrossThreadCalls</a:t>
+            </a:r>
+            <a:r>
+              <a:rPr lang="en-US" sz="2800" dirty="0" smtClean="0"/>
+              <a:t> </a:t>
+            </a:r>
+            <a:r>
+              <a:rPr lang="en-US" sz="2800" dirty="0"/>
+              <a:t>= false</a:t>
+            </a:r>
+            <a:r>
+              <a:rPr lang="en-US" sz="2800" dirty="0" smtClean="0"/>
+              <a:t>;</a:t>
+            </a:r>
+            <a:r>
+              <a:rPr lang="ru-RU" sz="2800" dirty="0" smtClean="0"/>
+              <a:t> в </a:t>
+            </a:r>
+            <a:r>
+              <a:rPr lang="en-US" sz="2800" dirty="0" smtClean="0"/>
+              <a:t>Windows Forms</a:t>
+            </a:r>
+            <a:endParaRPr lang="en-US" sz="2800" dirty="0" smtClean="0"/>
           </a:p>
           <a:p>
             <a:endParaRPr lang="en-US" dirty="0"/>
@@ -25267,11 +25312,11 @@
   <p:clrMapOvr>
     <a:masterClrMapping/>
   </p:clrMapOvr>
-  <mc:AlternateContent xmlns:mc="http://schemas.openxmlformats.org/markup-compatibility/2006">
-    <mc:Choice xmlns:p14="http://schemas.microsoft.com/office/powerpoint/2010/main" Requires="p14">
+  <mc:AlternateContent xmlns:mc="http://schemas.openxmlformats.org/markup-compatibility/2006" xmlns:p14="http://schemas.microsoft.com/office/powerpoint/2010/main">
+    <mc:Choice Requires="p14">
       <p:transition spd="slow" p14:dur="2000"/>
     </mc:Choice>
-    <mc:Fallback>
+    <mc:Fallback xmlns="">
       <p:transition spd="slow"/>
     </mc:Fallback>
   </mc:AlternateContent>

</xml_diff>

<commit_message>
Changed example for ThreadStatic
</commit_message>
<xml_diff>
--- a/Presentation/lesson-08-multithreading.pptx
+++ b/Presentation/lesson-08-multithreading.pptx
@@ -246,7 +246,7 @@
             <a:fld id="{B24A7054-7FFB-49F4-A126-5DF6E687FF53}" type="datetimeFigureOut">
               <a:rPr lang="ru-RU" smtClean="0"/>
               <a:pPr/>
-              <a:t>01.05.2016</a:t>
+              <a:t>29.05.2016</a:t>
             </a:fld>
             <a:endParaRPr lang="ru-RU" dirty="0"/>
           </a:p>
@@ -1530,7 +1530,7 @@
             <a:fld id="{8E6E6A2A-E9D3-4A0D-B04A-ABDD367A1E08}" type="datetimeFigureOut">
               <a:rPr lang="ru-RU" smtClean="0"/>
               <a:pPr/>
-              <a:t>01.05.2016</a:t>
+              <a:t>29.05.2016</a:t>
             </a:fld>
             <a:endParaRPr lang="ru-RU" dirty="0"/>
           </a:p>
@@ -1780,7 +1780,7 @@
                 </a:solidFill>
               </a:rPr>
               <a:pPr/>
-              <a:t>5/1/2016</a:t>
+              <a:t>5/29/2016</a:t>
             </a:fld>
             <a:endParaRPr lang="en-US" dirty="0">
               <a:solidFill>
@@ -1982,7 +1982,7 @@
                 </a:solidFill>
               </a:rPr>
               <a:pPr/>
-              <a:t>5/1/2016</a:t>
+              <a:t>5/29/2016</a:t>
             </a:fld>
             <a:endParaRPr lang="en-US" dirty="0">
               <a:solidFill>
@@ -2260,7 +2260,7 @@
                 </a:solidFill>
               </a:rPr>
               <a:pPr/>
-              <a:t>5/1/2016</a:t>
+              <a:t>5/29/2016</a:t>
             </a:fld>
             <a:endParaRPr lang="en-US" dirty="0">
               <a:solidFill>
@@ -2580,7 +2580,7 @@
                 </a:solidFill>
               </a:rPr>
               <a:pPr/>
-              <a:t>5/1/2016</a:t>
+              <a:t>5/29/2016</a:t>
             </a:fld>
             <a:endParaRPr lang="en-US" dirty="0">
               <a:solidFill>
@@ -3034,7 +3034,7 @@
                 </a:solidFill>
               </a:rPr>
               <a:pPr/>
-              <a:t>5/1/2016</a:t>
+              <a:t>5/29/2016</a:t>
             </a:fld>
             <a:endParaRPr lang="en-US" dirty="0">
               <a:solidFill>
@@ -3393,7 +3393,7 @@
                 </a:solidFill>
               </a:rPr>
               <a:pPr/>
-              <a:t>5/1/2016</a:t>
+              <a:t>5/29/2016</a:t>
             </a:fld>
             <a:endParaRPr lang="en-US" dirty="0">
               <a:solidFill>
@@ -3520,7 +3520,7 @@
                 </a:solidFill>
               </a:rPr>
               <a:pPr/>
-              <a:t>5/1/2016</a:t>
+              <a:t>5/29/2016</a:t>
             </a:fld>
             <a:endParaRPr lang="en-US" dirty="0">
               <a:solidFill>
@@ -3829,7 +3829,7 @@
                 </a:solidFill>
               </a:rPr>
               <a:pPr/>
-              <a:t>5/1/2016</a:t>
+              <a:t>5/29/2016</a:t>
             </a:fld>
             <a:endParaRPr lang="en-US" dirty="0">
               <a:solidFill>
@@ -4114,7 +4114,7 @@
                 </a:solidFill>
               </a:rPr>
               <a:pPr/>
-              <a:t>5/1/2016</a:t>
+              <a:t>5/29/2016</a:t>
             </a:fld>
             <a:endParaRPr lang="en-US" dirty="0">
               <a:solidFill>
@@ -4316,7 +4316,7 @@
                 </a:solidFill>
               </a:rPr>
               <a:pPr/>
-              <a:t>5/1/2016</a:t>
+              <a:t>5/29/2016</a:t>
             </a:fld>
             <a:endParaRPr lang="en-US" dirty="0">
               <a:solidFill>
@@ -4528,7 +4528,7 @@
                 </a:solidFill>
               </a:rPr>
               <a:pPr/>
-              <a:t>5/1/2016</a:t>
+              <a:t>5/29/2016</a:t>
             </a:fld>
             <a:endParaRPr lang="en-US" dirty="0">
               <a:solidFill>
@@ -5790,7 +5790,7 @@
             <a:fld id="{AC3D3127-B7C4-45E3-9797-C527EC9FDD78}" type="datetimeFigureOut">
               <a:rPr lang="ru-RU" smtClean="0"/>
               <a:pPr/>
-              <a:t>01.05.2016</a:t>
+              <a:t>29.05.2016</a:t>
             </a:fld>
             <a:endParaRPr lang="ru-RU" dirty="0"/>
           </a:p>
@@ -6318,7 +6318,7 @@
                 </a:solidFill>
               </a:rPr>
               <a:pPr/>
-              <a:t>5/1/2016</a:t>
+              <a:t>5/29/2016</a:t>
             </a:fld>
             <a:endParaRPr lang="en-US" dirty="0">
               <a:solidFill>
@@ -15574,21 +15574,14 @@
                 <a:latin typeface="Courier New" pitchFamily="49" charset="0"/>
                 <a:cs typeface="Courier New" pitchFamily="49" charset="0"/>
               </a:rPr>
-              <a:t>List&lt;int&gt; _numbers</a:t>
-            </a:r>
-            <a:r>
-              <a:rPr lang="ru-RU" sz="1600" dirty="0" smtClean="0">
-                <a:latin typeface="Courier New" pitchFamily="49" charset="0"/>
-                <a:cs typeface="Courier New" pitchFamily="49" charset="0"/>
-              </a:rPr>
-              <a:t> </a:t>
+              <a:t>List&lt;int&gt; _</a:t>
             </a:r>
             <a:r>
               <a:rPr lang="en-US" sz="1600" dirty="0" smtClean="0">
                 <a:latin typeface="Courier New" pitchFamily="49" charset="0"/>
                 <a:cs typeface="Courier New" pitchFamily="49" charset="0"/>
               </a:rPr>
-              <a:t>= new List&lt;int&gt;();</a:t>
+              <a:t>numbers;</a:t>
             </a:r>
             <a:r>
               <a:rPr lang="en-US" sz="1600" dirty="0">

</xml_diff>